<commit_message>
Need delete button and delete operation for admin page
</commit_message>
<xml_diff>
--- a/Logo.pptx
+++ b/Logo.pptx
@@ -104,6 +104,11 @@
       </a:defRPr>
     </a:lvl9pPr>
   </p:defaultTextStyle>
+  <p:extLst>
+    <p:ext uri="{EFAFB233-063F-42B5-8137-9DF3F51BA10A}">
+      <p15:sldGuideLst xmlns:p15="http://schemas.microsoft.com/office/powerpoint/2012/main"/>
+    </p:ext>
+  </p:extLst>
 </p:presentation>
 </file>
 
@@ -254,7 +259,7 @@
           <a:p>
             <a:fld id="{AF6C17BA-D83B-0744-9429-DBD3930EE9C1}" type="datetimeFigureOut">
               <a:rPr lang="en-US" smtClean="0"/>
-              <a:t>7/17/18</a:t>
+              <a:t>8/1/18</a:t>
             </a:fld>
             <a:endParaRPr lang="en-US"/>
           </a:p>
@@ -452,7 +457,7 @@
           <a:p>
             <a:fld id="{AF6C17BA-D83B-0744-9429-DBD3930EE9C1}" type="datetimeFigureOut">
               <a:rPr lang="en-US" smtClean="0"/>
-              <a:t>7/17/18</a:t>
+              <a:t>8/1/18</a:t>
             </a:fld>
             <a:endParaRPr lang="en-US"/>
           </a:p>
@@ -660,7 +665,7 @@
           <a:p>
             <a:fld id="{AF6C17BA-D83B-0744-9429-DBD3930EE9C1}" type="datetimeFigureOut">
               <a:rPr lang="en-US" smtClean="0"/>
-              <a:t>7/17/18</a:t>
+              <a:t>8/1/18</a:t>
             </a:fld>
             <a:endParaRPr lang="en-US"/>
           </a:p>
@@ -858,7 +863,7 @@
           <a:p>
             <a:fld id="{AF6C17BA-D83B-0744-9429-DBD3930EE9C1}" type="datetimeFigureOut">
               <a:rPr lang="en-US" smtClean="0"/>
-              <a:t>7/17/18</a:t>
+              <a:t>8/1/18</a:t>
             </a:fld>
             <a:endParaRPr lang="en-US"/>
           </a:p>
@@ -1133,7 +1138,7 @@
           <a:p>
             <a:fld id="{AF6C17BA-D83B-0744-9429-DBD3930EE9C1}" type="datetimeFigureOut">
               <a:rPr lang="en-US" smtClean="0"/>
-              <a:t>7/17/18</a:t>
+              <a:t>8/1/18</a:t>
             </a:fld>
             <a:endParaRPr lang="en-US"/>
           </a:p>
@@ -1398,7 +1403,7 @@
           <a:p>
             <a:fld id="{AF6C17BA-D83B-0744-9429-DBD3930EE9C1}" type="datetimeFigureOut">
               <a:rPr lang="en-US" smtClean="0"/>
-              <a:t>7/17/18</a:t>
+              <a:t>8/1/18</a:t>
             </a:fld>
             <a:endParaRPr lang="en-US"/>
           </a:p>
@@ -1810,7 +1815,7 @@
           <a:p>
             <a:fld id="{AF6C17BA-D83B-0744-9429-DBD3930EE9C1}" type="datetimeFigureOut">
               <a:rPr lang="en-US" smtClean="0"/>
-              <a:t>7/17/18</a:t>
+              <a:t>8/1/18</a:t>
             </a:fld>
             <a:endParaRPr lang="en-US"/>
           </a:p>
@@ -1951,7 +1956,7 @@
           <a:p>
             <a:fld id="{AF6C17BA-D83B-0744-9429-DBD3930EE9C1}" type="datetimeFigureOut">
               <a:rPr lang="en-US" smtClean="0"/>
-              <a:t>7/17/18</a:t>
+              <a:t>8/1/18</a:t>
             </a:fld>
             <a:endParaRPr lang="en-US"/>
           </a:p>
@@ -2064,7 +2069,7 @@
           <a:p>
             <a:fld id="{AF6C17BA-D83B-0744-9429-DBD3930EE9C1}" type="datetimeFigureOut">
               <a:rPr lang="en-US" smtClean="0"/>
-              <a:t>7/17/18</a:t>
+              <a:t>8/1/18</a:t>
             </a:fld>
             <a:endParaRPr lang="en-US"/>
           </a:p>
@@ -2375,7 +2380,7 @@
           <a:p>
             <a:fld id="{AF6C17BA-D83B-0744-9429-DBD3930EE9C1}" type="datetimeFigureOut">
               <a:rPr lang="en-US" smtClean="0"/>
-              <a:t>7/17/18</a:t>
+              <a:t>8/1/18</a:t>
             </a:fld>
             <a:endParaRPr lang="en-US"/>
           </a:p>
@@ -2663,7 +2668,7 @@
           <a:p>
             <a:fld id="{AF6C17BA-D83B-0744-9429-DBD3930EE9C1}" type="datetimeFigureOut">
               <a:rPr lang="en-US" smtClean="0"/>
-              <a:t>7/17/18</a:t>
+              <a:t>8/1/18</a:t>
             </a:fld>
             <a:endParaRPr lang="en-US"/>
           </a:p>
@@ -2904,7 +2909,7 @@
           <a:p>
             <a:fld id="{AF6C17BA-D83B-0744-9429-DBD3930EE9C1}" type="datetimeFigureOut">
               <a:rPr lang="en-US" smtClean="0"/>
-              <a:t>7/17/18</a:t>
+              <a:t>8/1/18</a:t>
             </a:fld>
             <a:endParaRPr lang="en-US"/>
           </a:p>
@@ -3436,6 +3441,103 @@
           </a:p>
         </p:txBody>
       </p:sp>
+      <p:sp>
+        <p:nvSpPr>
+          <p:cNvPr id="4" name="Title 1">
+            <a:extLst>
+              <a:ext uri="{FF2B5EF4-FFF2-40B4-BE49-F238E27FC236}">
+                <a16:creationId xmlns:a16="http://schemas.microsoft.com/office/drawing/2014/main" id="{20F94031-E54F-594A-9AD2-EEEC90B8733F}"/>
+              </a:ext>
+            </a:extLst>
+          </p:cNvPr>
+          <p:cNvSpPr txBox="1">
+            <a:spLocks noChangeAspect="1"/>
+          </p:cNvSpPr>
+          <p:nvPr/>
+        </p:nvSpPr>
+        <p:spPr>
+          <a:xfrm>
+            <a:off x="3919332" y="-474135"/>
+            <a:ext cx="7315200" cy="7315200"/>
+          </a:xfrm>
+          <a:prstGeom prst="rect">
+            <a:avLst/>
+          </a:prstGeom>
+          <a:noFill/>
+          <a:ln>
+            <a:noFill/>
+          </a:ln>
+        </p:spPr>
+        <p:style>
+          <a:lnRef idx="0">
+            <a:scrgbClr r="0" g="0" b="0"/>
+          </a:lnRef>
+          <a:fillRef idx="0">
+            <a:scrgbClr r="0" g="0" b="0"/>
+          </a:fillRef>
+          <a:effectRef idx="0">
+            <a:scrgbClr r="0" g="0" b="0"/>
+          </a:effectRef>
+          <a:fontRef idx="minor">
+            <a:schemeClr val="accent3"/>
+          </a:fontRef>
+        </p:style>
+        <p:txBody>
+          <a:bodyPr vert="horz" lIns="91440" tIns="45720" rIns="91440" bIns="45720" rtlCol="0" anchor="ctr" anchorCtr="0">
+            <a:noAutofit/>
+          </a:bodyPr>
+          <a:lstStyle>
+            <a:lvl1pPr algn="ctr" defTabSz="914400" rtl="0" eaLnBrk="1" latinLnBrk="0" hangingPunct="1">
+              <a:lnSpc>
+                <a:spcPct val="90000"/>
+              </a:lnSpc>
+              <a:spcBef>
+                <a:spcPct val="0"/>
+              </a:spcBef>
+              <a:buNone/>
+              <a:defRPr sz="6000" kern="1200">
+                <a:solidFill>
+                  <a:schemeClr val="tx1"/>
+                </a:solidFill>
+                <a:latin typeface="+mj-lt"/>
+                <a:ea typeface="+mj-ea"/>
+                <a:cs typeface="+mj-cs"/>
+              </a:defRPr>
+            </a:lvl1pPr>
+          </a:lstStyle>
+          <a:p>
+            <a:r>
+              <a:rPr lang="en-US" sz="35000" b="1" dirty="0" err="1">
+                <a:ln w="12700">
+                  <a:noFill/>
+                  <a:prstDash val="solid"/>
+                </a:ln>
+                <a:solidFill>
+                  <a:schemeClr val="bg2">
+                    <a:lumMod val="75000"/>
+                  </a:schemeClr>
+                </a:solidFill>
+                <a:latin typeface="Bauhaus 93" pitchFamily="82" charset="77"/>
+                <a:cs typeface="Phosphate Solid" panose="02000506050000020004" pitchFamily="2" charset="77"/>
+              </a:rPr>
+              <a:t>dP</a:t>
+            </a:r>
+            <a:endParaRPr lang="en-US" sz="35000" b="1" dirty="0">
+              <a:ln w="12700">
+                <a:noFill/>
+                <a:prstDash val="solid"/>
+              </a:ln>
+              <a:solidFill>
+                <a:schemeClr val="bg2">
+                  <a:lumMod val="75000"/>
+                </a:schemeClr>
+              </a:solidFill>
+              <a:latin typeface="Bauhaus 93" pitchFamily="82" charset="77"/>
+              <a:cs typeface="Phosphate Solid" panose="02000506050000020004" pitchFamily="2" charset="77"/>
+            </a:endParaRPr>
+          </a:p>
+        </p:txBody>
+      </p:sp>
     </p:spTree>
     <p:extLst>
       <p:ext uri="{BB962C8B-B14F-4D97-AF65-F5344CB8AC3E}">

</xml_diff>